<commit_message>
[#13] Continuing from previous spring with styling.  Will commit now before going back to live app for resurrection!
</commit_message>
<xml_diff>
--- a/lda-v03/trunk/documents/MockUps.pptx
+++ b/lda-v03/trunk/documents/MockUps.pptx
@@ -4404,7 +4404,7 @@
                 <a:latin typeface="Century Gothic"/>
                 <a:cs typeface="Century Gothic"/>
               </a:rPr>
-              <a:t>Galleries</a:t>
+              <a:t>Testimonials</a:t>
             </a:r>
             <a:endParaRPr lang="en-US" sz="600" dirty="0">
               <a:solidFill>
@@ -4593,7 +4593,7 @@
                 <a:latin typeface="Century Gothic"/>
                 <a:cs typeface="Century Gothic"/>
               </a:rPr>
-              <a:t>Testimonials</a:t>
+              <a:t>Galleries</a:t>
             </a:r>
             <a:endParaRPr lang="en-US" sz="600" dirty="0">
               <a:solidFill>
@@ -8772,421 +8772,6 @@
           </a:p>
         </p:txBody>
       </p:sp>
-      <p:sp>
-        <p:nvSpPr>
-          <p:cNvPr id="77" name="Reorder Icon"/>
-          <p:cNvSpPr>
-            <a:spLocks noEditPoints="1"/>
-          </p:cNvSpPr>
-          <p:nvPr/>
-        </p:nvSpPr>
-        <p:spPr bwMode="auto">
-          <a:xfrm>
-            <a:off x="3435317" y="671073"/>
-            <a:ext cx="133244" cy="108000"/>
-          </a:xfrm>
-          <a:custGeom>
-            <a:avLst/>
-            <a:gdLst>
-              <a:gd name="T0" fmla="*/ 1237 w 1237"/>
-              <a:gd name="T1" fmla="*/ 876 h 1030"/>
-              <a:gd name="T2" fmla="*/ 1237 w 1237"/>
-              <a:gd name="T3" fmla="*/ 979 h 1030"/>
-              <a:gd name="T4" fmla="*/ 1221 w 1237"/>
-              <a:gd name="T5" fmla="*/ 1015 h 1030"/>
-              <a:gd name="T6" fmla="*/ 1185 w 1237"/>
-              <a:gd name="T7" fmla="*/ 1030 h 1030"/>
-              <a:gd name="T8" fmla="*/ 51 w 1237"/>
-              <a:gd name="T9" fmla="*/ 1030 h 1030"/>
-              <a:gd name="T10" fmla="*/ 15 w 1237"/>
-              <a:gd name="T11" fmla="*/ 1015 h 1030"/>
-              <a:gd name="T12" fmla="*/ 0 w 1237"/>
-              <a:gd name="T13" fmla="*/ 979 h 1030"/>
-              <a:gd name="T14" fmla="*/ 0 w 1237"/>
-              <a:gd name="T15" fmla="*/ 876 h 1030"/>
-              <a:gd name="T16" fmla="*/ 15 w 1237"/>
-              <a:gd name="T17" fmla="*/ 839 h 1030"/>
-              <a:gd name="T18" fmla="*/ 51 w 1237"/>
-              <a:gd name="T19" fmla="*/ 824 h 1030"/>
-              <a:gd name="T20" fmla="*/ 1185 w 1237"/>
-              <a:gd name="T21" fmla="*/ 824 h 1030"/>
-              <a:gd name="T22" fmla="*/ 1221 w 1237"/>
-              <a:gd name="T23" fmla="*/ 839 h 1030"/>
-              <a:gd name="T24" fmla="*/ 1237 w 1237"/>
-              <a:gd name="T25" fmla="*/ 876 h 1030"/>
-              <a:gd name="T26" fmla="*/ 1237 w 1237"/>
-              <a:gd name="T27" fmla="*/ 463 h 1030"/>
-              <a:gd name="T28" fmla="*/ 1237 w 1237"/>
-              <a:gd name="T29" fmla="*/ 567 h 1030"/>
-              <a:gd name="T30" fmla="*/ 1221 w 1237"/>
-              <a:gd name="T31" fmla="*/ 603 h 1030"/>
-              <a:gd name="T32" fmla="*/ 1185 w 1237"/>
-              <a:gd name="T33" fmla="*/ 618 h 1030"/>
-              <a:gd name="T34" fmla="*/ 51 w 1237"/>
-              <a:gd name="T35" fmla="*/ 618 h 1030"/>
-              <a:gd name="T36" fmla="*/ 15 w 1237"/>
-              <a:gd name="T37" fmla="*/ 603 h 1030"/>
-              <a:gd name="T38" fmla="*/ 0 w 1237"/>
-              <a:gd name="T39" fmla="*/ 567 h 1030"/>
-              <a:gd name="T40" fmla="*/ 0 w 1237"/>
-              <a:gd name="T41" fmla="*/ 463 h 1030"/>
-              <a:gd name="T42" fmla="*/ 15 w 1237"/>
-              <a:gd name="T43" fmla="*/ 427 h 1030"/>
-              <a:gd name="T44" fmla="*/ 51 w 1237"/>
-              <a:gd name="T45" fmla="*/ 412 h 1030"/>
-              <a:gd name="T46" fmla="*/ 1185 w 1237"/>
-              <a:gd name="T47" fmla="*/ 412 h 1030"/>
-              <a:gd name="T48" fmla="*/ 1221 w 1237"/>
-              <a:gd name="T49" fmla="*/ 427 h 1030"/>
-              <a:gd name="T50" fmla="*/ 1237 w 1237"/>
-              <a:gd name="T51" fmla="*/ 463 h 1030"/>
-              <a:gd name="T52" fmla="*/ 1237 w 1237"/>
-              <a:gd name="T53" fmla="*/ 51 h 1030"/>
-              <a:gd name="T54" fmla="*/ 1237 w 1237"/>
-              <a:gd name="T55" fmla="*/ 154 h 1030"/>
-              <a:gd name="T56" fmla="*/ 1221 w 1237"/>
-              <a:gd name="T57" fmla="*/ 191 h 1030"/>
-              <a:gd name="T58" fmla="*/ 1185 w 1237"/>
-              <a:gd name="T59" fmla="*/ 206 h 1030"/>
-              <a:gd name="T60" fmla="*/ 51 w 1237"/>
-              <a:gd name="T61" fmla="*/ 206 h 1030"/>
-              <a:gd name="T62" fmla="*/ 15 w 1237"/>
-              <a:gd name="T63" fmla="*/ 191 h 1030"/>
-              <a:gd name="T64" fmla="*/ 0 w 1237"/>
-              <a:gd name="T65" fmla="*/ 154 h 1030"/>
-              <a:gd name="T66" fmla="*/ 0 w 1237"/>
-              <a:gd name="T67" fmla="*/ 51 h 1030"/>
-              <a:gd name="T68" fmla="*/ 15 w 1237"/>
-              <a:gd name="T69" fmla="*/ 15 h 1030"/>
-              <a:gd name="T70" fmla="*/ 51 w 1237"/>
-              <a:gd name="T71" fmla="*/ 0 h 1030"/>
-              <a:gd name="T72" fmla="*/ 1185 w 1237"/>
-              <a:gd name="T73" fmla="*/ 0 h 1030"/>
-              <a:gd name="T74" fmla="*/ 1221 w 1237"/>
-              <a:gd name="T75" fmla="*/ 15 h 1030"/>
-              <a:gd name="T76" fmla="*/ 1237 w 1237"/>
-              <a:gd name="T77" fmla="*/ 51 h 1030"/>
-            </a:gdLst>
-            <a:ahLst/>
-            <a:cxnLst>
-              <a:cxn ang="0">
-                <a:pos x="T0" y="T1"/>
-              </a:cxn>
-              <a:cxn ang="0">
-                <a:pos x="T2" y="T3"/>
-              </a:cxn>
-              <a:cxn ang="0">
-                <a:pos x="T4" y="T5"/>
-              </a:cxn>
-              <a:cxn ang="0">
-                <a:pos x="T6" y="T7"/>
-              </a:cxn>
-              <a:cxn ang="0">
-                <a:pos x="T8" y="T9"/>
-              </a:cxn>
-              <a:cxn ang="0">
-                <a:pos x="T10" y="T11"/>
-              </a:cxn>
-              <a:cxn ang="0">
-                <a:pos x="T12" y="T13"/>
-              </a:cxn>
-              <a:cxn ang="0">
-                <a:pos x="T14" y="T15"/>
-              </a:cxn>
-              <a:cxn ang="0">
-                <a:pos x="T16" y="T17"/>
-              </a:cxn>
-              <a:cxn ang="0">
-                <a:pos x="T18" y="T19"/>
-              </a:cxn>
-              <a:cxn ang="0">
-                <a:pos x="T20" y="T21"/>
-              </a:cxn>
-              <a:cxn ang="0">
-                <a:pos x="T22" y="T23"/>
-              </a:cxn>
-              <a:cxn ang="0">
-                <a:pos x="T24" y="T25"/>
-              </a:cxn>
-              <a:cxn ang="0">
-                <a:pos x="T26" y="T27"/>
-              </a:cxn>
-              <a:cxn ang="0">
-                <a:pos x="T28" y="T29"/>
-              </a:cxn>
-              <a:cxn ang="0">
-                <a:pos x="T30" y="T31"/>
-              </a:cxn>
-              <a:cxn ang="0">
-                <a:pos x="T32" y="T33"/>
-              </a:cxn>
-              <a:cxn ang="0">
-                <a:pos x="T34" y="T35"/>
-              </a:cxn>
-              <a:cxn ang="0">
-                <a:pos x="T36" y="T37"/>
-              </a:cxn>
-              <a:cxn ang="0">
-                <a:pos x="T38" y="T39"/>
-              </a:cxn>
-              <a:cxn ang="0">
-                <a:pos x="T40" y="T41"/>
-              </a:cxn>
-              <a:cxn ang="0">
-                <a:pos x="T42" y="T43"/>
-              </a:cxn>
-              <a:cxn ang="0">
-                <a:pos x="T44" y="T45"/>
-              </a:cxn>
-              <a:cxn ang="0">
-                <a:pos x="T46" y="T47"/>
-              </a:cxn>
-              <a:cxn ang="0">
-                <a:pos x="T48" y="T49"/>
-              </a:cxn>
-              <a:cxn ang="0">
-                <a:pos x="T50" y="T51"/>
-              </a:cxn>
-              <a:cxn ang="0">
-                <a:pos x="T52" y="T53"/>
-              </a:cxn>
-              <a:cxn ang="0">
-                <a:pos x="T54" y="T55"/>
-              </a:cxn>
-              <a:cxn ang="0">
-                <a:pos x="T56" y="T57"/>
-              </a:cxn>
-              <a:cxn ang="0">
-                <a:pos x="T58" y="T59"/>
-              </a:cxn>
-              <a:cxn ang="0">
-                <a:pos x="T60" y="T61"/>
-              </a:cxn>
-              <a:cxn ang="0">
-                <a:pos x="T62" y="T63"/>
-              </a:cxn>
-              <a:cxn ang="0">
-                <a:pos x="T64" y="T65"/>
-              </a:cxn>
-              <a:cxn ang="0">
-                <a:pos x="T66" y="T67"/>
-              </a:cxn>
-              <a:cxn ang="0">
-                <a:pos x="T68" y="T69"/>
-              </a:cxn>
-              <a:cxn ang="0">
-                <a:pos x="T70" y="T71"/>
-              </a:cxn>
-              <a:cxn ang="0">
-                <a:pos x="T72" y="T73"/>
-              </a:cxn>
-              <a:cxn ang="0">
-                <a:pos x="T74" y="T75"/>
-              </a:cxn>
-              <a:cxn ang="0">
-                <a:pos x="T76" y="T77"/>
-              </a:cxn>
-            </a:cxnLst>
-            <a:rect l="0" t="0" r="r" b="b"/>
-            <a:pathLst>
-              <a:path w="1237" h="1030">
-                <a:moveTo>
-                  <a:pt x="1237" y="876"/>
-                </a:moveTo>
-                <a:lnTo>
-                  <a:pt x="1237" y="979"/>
-                </a:lnTo>
-                <a:cubicBezTo>
-                  <a:pt x="1237" y="993"/>
-                  <a:pt x="1231" y="1005"/>
-                  <a:pt x="1221" y="1015"/>
-                </a:cubicBezTo>
-                <a:cubicBezTo>
-                  <a:pt x="1211" y="1025"/>
-                  <a:pt x="1199" y="1030"/>
-                  <a:pt x="1185" y="1030"/>
-                </a:cubicBezTo>
-                <a:lnTo>
-                  <a:pt x="51" y="1030"/>
-                </a:lnTo>
-                <a:cubicBezTo>
-                  <a:pt x="38" y="1030"/>
-                  <a:pt x="25" y="1025"/>
-                  <a:pt x="15" y="1015"/>
-                </a:cubicBezTo>
-                <a:cubicBezTo>
-                  <a:pt x="5" y="1005"/>
-                  <a:pt x="0" y="993"/>
-                  <a:pt x="0" y="979"/>
-                </a:cubicBezTo>
-                <a:lnTo>
-                  <a:pt x="0" y="876"/>
-                </a:lnTo>
-                <a:cubicBezTo>
-                  <a:pt x="0" y="862"/>
-                  <a:pt x="5" y="850"/>
-                  <a:pt x="15" y="839"/>
-                </a:cubicBezTo>
-                <a:cubicBezTo>
-                  <a:pt x="25" y="829"/>
-                  <a:pt x="38" y="824"/>
-                  <a:pt x="51" y="824"/>
-                </a:cubicBezTo>
-                <a:lnTo>
-                  <a:pt x="1185" y="824"/>
-                </a:lnTo>
-                <a:cubicBezTo>
-                  <a:pt x="1199" y="824"/>
-                  <a:pt x="1211" y="829"/>
-                  <a:pt x="1221" y="839"/>
-                </a:cubicBezTo>
-                <a:cubicBezTo>
-                  <a:pt x="1231" y="850"/>
-                  <a:pt x="1237" y="862"/>
-                  <a:pt x="1237" y="876"/>
-                </a:cubicBezTo>
-                <a:close/>
-                <a:moveTo>
-                  <a:pt x="1237" y="463"/>
-                </a:moveTo>
-                <a:lnTo>
-                  <a:pt x="1237" y="567"/>
-                </a:lnTo>
-                <a:cubicBezTo>
-                  <a:pt x="1237" y="580"/>
-                  <a:pt x="1231" y="593"/>
-                  <a:pt x="1221" y="603"/>
-                </a:cubicBezTo>
-                <a:cubicBezTo>
-                  <a:pt x="1211" y="613"/>
-                  <a:pt x="1199" y="618"/>
-                  <a:pt x="1185" y="618"/>
-                </a:cubicBezTo>
-                <a:lnTo>
-                  <a:pt x="51" y="618"/>
-                </a:lnTo>
-                <a:cubicBezTo>
-                  <a:pt x="38" y="618"/>
-                  <a:pt x="25" y="613"/>
-                  <a:pt x="15" y="603"/>
-                </a:cubicBezTo>
-                <a:cubicBezTo>
-                  <a:pt x="5" y="593"/>
-                  <a:pt x="0" y="580"/>
-                  <a:pt x="0" y="567"/>
-                </a:cubicBezTo>
-                <a:lnTo>
-                  <a:pt x="0" y="463"/>
-                </a:lnTo>
-                <a:cubicBezTo>
-                  <a:pt x="0" y="450"/>
-                  <a:pt x="5" y="437"/>
-                  <a:pt x="15" y="427"/>
-                </a:cubicBezTo>
-                <a:cubicBezTo>
-                  <a:pt x="25" y="417"/>
-                  <a:pt x="38" y="412"/>
-                  <a:pt x="51" y="412"/>
-                </a:cubicBezTo>
-                <a:lnTo>
-                  <a:pt x="1185" y="412"/>
-                </a:lnTo>
-                <a:cubicBezTo>
-                  <a:pt x="1199" y="412"/>
-                  <a:pt x="1211" y="417"/>
-                  <a:pt x="1221" y="427"/>
-                </a:cubicBezTo>
-                <a:cubicBezTo>
-                  <a:pt x="1231" y="437"/>
-                  <a:pt x="1237" y="450"/>
-                  <a:pt x="1237" y="463"/>
-                </a:cubicBezTo>
-                <a:close/>
-                <a:moveTo>
-                  <a:pt x="1237" y="51"/>
-                </a:moveTo>
-                <a:lnTo>
-                  <a:pt x="1237" y="154"/>
-                </a:lnTo>
-                <a:cubicBezTo>
-                  <a:pt x="1237" y="168"/>
-                  <a:pt x="1231" y="180"/>
-                  <a:pt x="1221" y="191"/>
-                </a:cubicBezTo>
-                <a:cubicBezTo>
-                  <a:pt x="1211" y="201"/>
-                  <a:pt x="1199" y="206"/>
-                  <a:pt x="1185" y="206"/>
-                </a:cubicBezTo>
-                <a:lnTo>
-                  <a:pt x="51" y="206"/>
-                </a:lnTo>
-                <a:cubicBezTo>
-                  <a:pt x="38" y="206"/>
-                  <a:pt x="25" y="201"/>
-                  <a:pt x="15" y="191"/>
-                </a:cubicBezTo>
-                <a:cubicBezTo>
-                  <a:pt x="5" y="180"/>
-                  <a:pt x="0" y="168"/>
-                  <a:pt x="0" y="154"/>
-                </a:cubicBezTo>
-                <a:lnTo>
-                  <a:pt x="0" y="51"/>
-                </a:lnTo>
-                <a:cubicBezTo>
-                  <a:pt x="0" y="37"/>
-                  <a:pt x="5" y="25"/>
-                  <a:pt x="15" y="15"/>
-                </a:cubicBezTo>
-                <a:cubicBezTo>
-                  <a:pt x="25" y="5"/>
-                  <a:pt x="38" y="0"/>
-                  <a:pt x="51" y="0"/>
-                </a:cubicBezTo>
-                <a:lnTo>
-                  <a:pt x="1185" y="0"/>
-                </a:lnTo>
-                <a:cubicBezTo>
-                  <a:pt x="1199" y="0"/>
-                  <a:pt x="1211" y="5"/>
-                  <a:pt x="1221" y="15"/>
-                </a:cubicBezTo>
-                <a:cubicBezTo>
-                  <a:pt x="1231" y="25"/>
-                  <a:pt x="1237" y="37"/>
-                  <a:pt x="1237" y="51"/>
-                </a:cubicBezTo>
-                <a:close/>
-              </a:path>
-            </a:pathLst>
-          </a:custGeom>
-          <a:solidFill>
-            <a:schemeClr val="accent2"/>
-          </a:solidFill>
-          <a:ln w="0">
-            <a:noFill/>
-            <a:prstDash val="solid"/>
-            <a:round/>
-            <a:headEnd/>
-            <a:tailEnd/>
-          </a:ln>
-        </p:spPr>
-        <p:txBody>
-          <a:bodyPr vert="horz" wrap="square" lIns="91440" tIns="45720" rIns="91440" bIns="45720" numCol="1" anchor="t" anchorCtr="0" compatLnSpc="1">
-            <a:prstTxWarp prst="textNoShape">
-              <a:avLst/>
-            </a:prstTxWarp>
-          </a:bodyPr>
-          <a:lstStyle/>
-          <a:p>
-            <a:endParaRPr lang="en-US" sz="1050">
-              <a:latin typeface="Arial" panose="020B0604020202020204" pitchFamily="34" charset="0"/>
-              <a:cs typeface="Arial" panose="020B0604020202020204" pitchFamily="34" charset="0"/>
-            </a:endParaRPr>
-          </a:p>
-        </p:txBody>
-      </p:sp>
       <p:grpSp>
         <p:nvGrpSpPr>
           <p:cNvPr id="95" name="Group 94"/>

</xml_diff>